<commit_message>
Updating presentation on react
</commit_message>
<xml_diff>
--- a/reactjs-introduction.pptx
+++ b/reactjs-introduction.pptx
@@ -5,17 +5,16 @@
     <p:sldMasterId id="2147483648" r:id="rId1"/>
   </p:sldMasterIdLst>
   <p:notesMasterIdLst>
-    <p:notesMasterId r:id="rId10"/>
+    <p:notesMasterId r:id="rId9"/>
   </p:notesMasterIdLst>
   <p:sldIdLst>
     <p:sldId id="256" r:id="rId2"/>
     <p:sldId id="257" r:id="rId3"/>
-    <p:sldId id="258" r:id="rId4"/>
-    <p:sldId id="259" r:id="rId5"/>
-    <p:sldId id="260" r:id="rId6"/>
-    <p:sldId id="261" r:id="rId7"/>
-    <p:sldId id="262" r:id="rId8"/>
-    <p:sldId id="263" r:id="rId9"/>
+    <p:sldId id="264" r:id="rId4"/>
+    <p:sldId id="258" r:id="rId5"/>
+    <p:sldId id="259" r:id="rId6"/>
+    <p:sldId id="260" r:id="rId7"/>
+    <p:sldId id="261" r:id="rId8"/>
   </p:sldIdLst>
   <p:sldSz cx="12192000" cy="6858000"/>
   <p:notesSz cx="6858000" cy="9144000"/>
@@ -204,7 +203,7 @@
           <a:p>
             <a:fld id="{090A99B7-E0D7-4003-B5A9-C168F009F347}" type="datetimeFigureOut">
               <a:rPr lang="en-NZ" smtClean="0"/>
-              <a:t>10/07/2018</a:t>
+              <a:t>17/07/2018</a:t>
             </a:fld>
             <a:endParaRPr lang="en-NZ"/>
           </a:p>
@@ -600,23 +599,6 @@
           <a:bodyPr/>
           <a:lstStyle/>
           <a:p>
-            <a:pPr marL="0" marR="0" lvl="0" indent="0" algn="l" defTabSz="914400" rtl="0" eaLnBrk="1" fontAlgn="auto" latinLnBrk="0" hangingPunct="1">
-              <a:lnSpc>
-                <a:spcPct val="100000"/>
-              </a:lnSpc>
-              <a:spcBef>
-                <a:spcPts val="0"/>
-              </a:spcBef>
-              <a:spcAft>
-                <a:spcPts val="0"/>
-              </a:spcAft>
-              <a:buClrTx/>
-              <a:buSzTx/>
-              <a:buFontTx/>
-              <a:buNone/>
-              <a:tabLst/>
-              <a:defRPr/>
-            </a:pPr>
             <a:endParaRPr lang="en-NZ" dirty="0"/>
           </a:p>
         </p:txBody>
@@ -638,7 +620,7 @@
           <a:p>
             <a:fld id="{B06DD2BD-3F3D-4FC7-B460-2FE86027E3E6}" type="slidenum">
               <a:rPr lang="en-NZ" smtClean="0"/>
-              <a:t>6</a:t>
+              <a:t>3</a:t>
             </a:fld>
             <a:endParaRPr lang="en-NZ"/>
           </a:p>
@@ -647,7 +629,7 @@
     </p:spTree>
     <p:extLst>
       <p:ext uri="{BB962C8B-B14F-4D97-AF65-F5344CB8AC3E}">
-        <p14:creationId xmlns:p14="http://schemas.microsoft.com/office/powerpoint/2010/main" val="1975167362"/>
+        <p14:creationId xmlns:p14="http://schemas.microsoft.com/office/powerpoint/2010/main" val="1898725856"/>
       </p:ext>
     </p:extLst>
   </p:cSld>
@@ -748,108 +730,7 @@
     </p:spTree>
     <p:extLst>
       <p:ext uri="{BB962C8B-B14F-4D97-AF65-F5344CB8AC3E}">
-        <p14:creationId xmlns:p14="http://schemas.microsoft.com/office/powerpoint/2010/main" val="3572358052"/>
-      </p:ext>
-    </p:extLst>
-  </p:cSld>
-  <p:clrMapOvr>
-    <a:masterClrMapping/>
-  </p:clrMapOvr>
-</p:notes>
-</file>
-
-<file path=ppt/notesSlides/notesSlide4.xml><?xml version="1.0" encoding="utf-8"?>
-<p:notes xmlns:a="http://schemas.openxmlformats.org/drawingml/2006/main" xmlns:r="http://schemas.openxmlformats.org/officeDocument/2006/relationships" xmlns:p="http://schemas.openxmlformats.org/presentationml/2006/main">
-  <p:cSld>
-    <p:spTree>
-      <p:nvGrpSpPr>
-        <p:cNvPr id="1" name=""/>
-        <p:cNvGrpSpPr/>
-        <p:nvPr/>
-      </p:nvGrpSpPr>
-      <p:grpSpPr>
-        <a:xfrm>
-          <a:off x="0" y="0"/>
-          <a:ext cx="0" cy="0"/>
-          <a:chOff x="0" y="0"/>
-          <a:chExt cx="0" cy="0"/>
-        </a:xfrm>
-      </p:grpSpPr>
-      <p:sp>
-        <p:nvSpPr>
-          <p:cNvPr id="2" name="Slide Image Placeholder 1"/>
-          <p:cNvSpPr>
-            <a:spLocks noGrp="1" noRot="1" noChangeAspect="1"/>
-          </p:cNvSpPr>
-          <p:nvPr>
-            <p:ph type="sldImg"/>
-          </p:nvPr>
-        </p:nvSpPr>
-        <p:spPr/>
-      </p:sp>
-      <p:sp>
-        <p:nvSpPr>
-          <p:cNvPr id="3" name="Notes Placeholder 2"/>
-          <p:cNvSpPr>
-            <a:spLocks noGrp="1"/>
-          </p:cNvSpPr>
-          <p:nvPr>
-            <p:ph type="body" idx="1"/>
-          </p:nvPr>
-        </p:nvSpPr>
-        <p:spPr/>
-        <p:txBody>
-          <a:bodyPr/>
-          <a:lstStyle/>
-          <a:p>
-            <a:pPr marL="0" marR="0" lvl="0" indent="0" algn="l" defTabSz="914400" rtl="0" eaLnBrk="1" fontAlgn="auto" latinLnBrk="0" hangingPunct="1">
-              <a:lnSpc>
-                <a:spcPct val="100000"/>
-              </a:lnSpc>
-              <a:spcBef>
-                <a:spcPts val="0"/>
-              </a:spcBef>
-              <a:spcAft>
-                <a:spcPts val="0"/>
-              </a:spcAft>
-              <a:buClrTx/>
-              <a:buSzTx/>
-              <a:buFontTx/>
-              <a:buNone/>
-              <a:tabLst/>
-              <a:defRPr/>
-            </a:pPr>
-            <a:endParaRPr lang="en-NZ" dirty="0"/>
-          </a:p>
-        </p:txBody>
-      </p:sp>
-      <p:sp>
-        <p:nvSpPr>
-          <p:cNvPr id="4" name="Slide Number Placeholder 3"/>
-          <p:cNvSpPr>
-            <a:spLocks noGrp="1"/>
-          </p:cNvSpPr>
-          <p:nvPr>
-            <p:ph type="sldNum" sz="quarter" idx="10"/>
-          </p:nvPr>
-        </p:nvSpPr>
-        <p:spPr/>
-        <p:txBody>
-          <a:bodyPr/>
-          <a:lstStyle/>
-          <a:p>
-            <a:fld id="{B06DD2BD-3F3D-4FC7-B460-2FE86027E3E6}" type="slidenum">
-              <a:rPr lang="en-NZ" smtClean="0"/>
-              <a:t>8</a:t>
-            </a:fld>
-            <a:endParaRPr lang="en-NZ"/>
-          </a:p>
-        </p:txBody>
-      </p:sp>
-    </p:spTree>
-    <p:extLst>
-      <p:ext uri="{BB962C8B-B14F-4D97-AF65-F5344CB8AC3E}">
-        <p14:creationId xmlns:p14="http://schemas.microsoft.com/office/powerpoint/2010/main" val="1078706018"/>
+        <p14:creationId xmlns:p14="http://schemas.microsoft.com/office/powerpoint/2010/main" val="1975167362"/>
       </p:ext>
     </p:extLst>
   </p:cSld>
@@ -1523,7 +1404,7 @@
             <a:fld id="{B61BEF0D-F0BB-DE4B-95CE-6DB70DBA9567}" type="datetimeFigureOut">
               <a:rPr lang="en-US" dirty="0"/>
               <a:pPr/>
-              <a:t>7/10/2018</a:t>
+              <a:t>7/17/2018</a:t>
             </a:fld>
             <a:endParaRPr lang="en-US" dirty="0"/>
           </a:p>
@@ -1770,7 +1651,7 @@
             <a:fld id="{B61BEF0D-F0BB-DE4B-95CE-6DB70DBA9567}" type="datetimeFigureOut">
               <a:rPr lang="en-US" dirty="0"/>
               <a:pPr/>
-              <a:t>7/10/2018</a:t>
+              <a:t>7/17/2018</a:t>
             </a:fld>
             <a:endParaRPr lang="en-US" dirty="0"/>
           </a:p>
@@ -2075,7 +1956,7 @@
             <a:fld id="{B61BEF0D-F0BB-DE4B-95CE-6DB70DBA9567}" type="datetimeFigureOut">
               <a:rPr lang="en-US" dirty="0"/>
               <a:pPr/>
-              <a:t>7/10/2018</a:t>
+              <a:t>7/17/2018</a:t>
             </a:fld>
             <a:endParaRPr lang="en-US" dirty="0"/>
           </a:p>
@@ -2390,7 +2271,7 @@
             <a:fld id="{B61BEF0D-F0BB-DE4B-95CE-6DB70DBA9567}" type="datetimeFigureOut">
               <a:rPr lang="en-US" dirty="0"/>
               <a:pPr/>
-              <a:t>7/10/2018</a:t>
+              <a:t>7/17/2018</a:t>
             </a:fld>
             <a:endParaRPr lang="en-US" dirty="0"/>
           </a:p>
@@ -2689,7 +2570,7 @@
             <a:fld id="{B61BEF0D-F0BB-DE4B-95CE-6DB70DBA9567}" type="datetimeFigureOut">
               <a:rPr lang="en-US" dirty="0"/>
               <a:pPr/>
-              <a:t>7/10/2018</a:t>
+              <a:t>7/17/2018</a:t>
             </a:fld>
             <a:endParaRPr lang="en-US" dirty="0"/>
           </a:p>
@@ -3053,7 +2934,7 @@
             <a:fld id="{B61BEF0D-F0BB-DE4B-95CE-6DB70DBA9567}" type="datetimeFigureOut">
               <a:rPr lang="en-US" dirty="0"/>
               <a:pPr/>
-              <a:t>7/10/2018</a:t>
+              <a:t>7/17/2018</a:t>
             </a:fld>
             <a:endParaRPr lang="en-US" dirty="0"/>
           </a:p>
@@ -3224,7 +3105,7 @@
             <a:fld id="{B61BEF0D-F0BB-DE4B-95CE-6DB70DBA9567}" type="datetimeFigureOut">
               <a:rPr lang="en-US" dirty="0"/>
               <a:pPr/>
-              <a:t>7/10/2018</a:t>
+              <a:t>7/17/2018</a:t>
             </a:fld>
             <a:endParaRPr lang="en-US" dirty="0"/>
           </a:p>
@@ -3401,7 +3282,7 @@
             <a:fld id="{B61BEF0D-F0BB-DE4B-95CE-6DB70DBA9567}" type="datetimeFigureOut">
               <a:rPr lang="en-US" dirty="0"/>
               <a:pPr/>
-              <a:t>7/10/2018</a:t>
+              <a:t>7/17/2018</a:t>
             </a:fld>
             <a:endParaRPr lang="en-US" dirty="0"/>
           </a:p>
@@ -3568,7 +3449,7 @@
             <a:fld id="{B61BEF0D-F0BB-DE4B-95CE-6DB70DBA9567}" type="datetimeFigureOut">
               <a:rPr lang="en-US" dirty="0"/>
               <a:pPr/>
-              <a:t>7/10/2018</a:t>
+              <a:t>7/17/2018</a:t>
             </a:fld>
             <a:endParaRPr lang="en-US" dirty="0"/>
           </a:p>
@@ -3815,7 +3696,7 @@
             <a:fld id="{B61BEF0D-F0BB-DE4B-95CE-6DB70DBA9567}" type="datetimeFigureOut">
               <a:rPr lang="en-US" dirty="0"/>
               <a:pPr/>
-              <a:t>7/10/2018</a:t>
+              <a:t>7/17/2018</a:t>
             </a:fld>
             <a:endParaRPr lang="en-US" dirty="0"/>
           </a:p>
@@ -4048,7 +3929,7 @@
             <a:fld id="{B61BEF0D-F0BB-DE4B-95CE-6DB70DBA9567}" type="datetimeFigureOut">
               <a:rPr lang="en-US" dirty="0"/>
               <a:pPr/>
-              <a:t>7/10/2018</a:t>
+              <a:t>7/17/2018</a:t>
             </a:fld>
             <a:endParaRPr lang="en-US" dirty="0"/>
           </a:p>
@@ -4427,7 +4308,7 @@
             <a:fld id="{B61BEF0D-F0BB-DE4B-95CE-6DB70DBA9567}" type="datetimeFigureOut">
               <a:rPr lang="en-US" dirty="0"/>
               <a:pPr/>
-              <a:t>7/10/2018</a:t>
+              <a:t>7/17/2018</a:t>
             </a:fld>
             <a:endParaRPr lang="en-US" dirty="0"/>
           </a:p>
@@ -4542,7 +4423,7 @@
             <a:fld id="{B61BEF0D-F0BB-DE4B-95CE-6DB70DBA9567}" type="datetimeFigureOut">
               <a:rPr lang="en-US" dirty="0"/>
               <a:pPr/>
-              <a:t>7/10/2018</a:t>
+              <a:t>7/17/2018</a:t>
             </a:fld>
             <a:endParaRPr lang="en-US" dirty="0"/>
           </a:p>
@@ -4634,7 +4515,7 @@
             <a:fld id="{B61BEF0D-F0BB-DE4B-95CE-6DB70DBA9567}" type="datetimeFigureOut">
               <a:rPr lang="en-US" dirty="0"/>
               <a:pPr/>
-              <a:t>7/10/2018</a:t>
+              <a:t>7/17/2018</a:t>
             </a:fld>
             <a:endParaRPr lang="en-US" dirty="0"/>
           </a:p>
@@ -4886,7 +4767,7 @@
             <a:fld id="{B61BEF0D-F0BB-DE4B-95CE-6DB70DBA9567}" type="datetimeFigureOut">
               <a:rPr lang="en-US" dirty="0"/>
               <a:pPr/>
-              <a:t>7/10/2018</a:t>
+              <a:t>7/17/2018</a:t>
             </a:fld>
             <a:endParaRPr lang="en-US" dirty="0"/>
           </a:p>
@@ -5166,7 +5047,7 @@
             <a:fld id="{B61BEF0D-F0BB-DE4B-95CE-6DB70DBA9567}" type="datetimeFigureOut">
               <a:rPr lang="en-US" dirty="0"/>
               <a:pPr/>
-              <a:t>7/10/2018</a:t>
+              <a:t>7/17/2018</a:t>
             </a:fld>
             <a:endParaRPr lang="en-US" dirty="0"/>
           </a:p>
@@ -5569,7 +5450,7 @@
             <a:fld id="{B61BEF0D-F0BB-DE4B-95CE-6DB70DBA9567}" type="datetimeFigureOut">
               <a:rPr lang="en-US" dirty="0"/>
               <a:pPr/>
-              <a:t>7/10/2018</a:t>
+              <a:t>7/17/2018</a:t>
             </a:fld>
             <a:endParaRPr lang="en-US" dirty="0"/>
           </a:p>
@@ -6305,7 +6186,7 @@
               <a:rPr lang="en-NZ" dirty="0" smtClean="0">
                 <a:latin typeface="Imprint MT Shadow" panose="04020605060303030202" pitchFamily="82" charset="0"/>
               </a:rPr>
-              <a:t>History</a:t>
+              <a:t>Agenda</a:t>
             </a:r>
             <a:endParaRPr lang="en-NZ" dirty="0">
               <a:latin typeface="Imprint MT Shadow" panose="04020605060303030202" pitchFamily="82" charset="0"/>
@@ -6326,13 +6207,16 @@
         <p:spPr>
           <a:xfrm>
             <a:off x="684211" y="1064624"/>
-            <a:ext cx="6957559" cy="5427616"/>
+            <a:ext cx="7631653" cy="5427616"/>
           </a:xfrm>
         </p:spPr>
         <p:txBody>
           <a:bodyPr/>
           <a:lstStyle/>
           <a:p>
+            <a:pPr marL="457200" indent="-457200">
+              <a:buAutoNum type="arabicParenR"/>
+            </a:pPr>
             <a:endParaRPr lang="en-NZ" b="1" dirty="0" smtClean="0">
               <a:solidFill>
                 <a:schemeClr val="tx1"/>
@@ -6340,21 +6224,16 @@
             </a:endParaRPr>
           </a:p>
           <a:p>
+            <a:pPr marL="457200" indent="-457200">
+              <a:buAutoNum type="arabicParenR"/>
+            </a:pPr>
             <a:r>
               <a:rPr lang="en-NZ" b="1" dirty="0" smtClean="0">
                 <a:solidFill>
                   <a:schemeClr val="tx1"/>
                 </a:solidFill>
               </a:rPr>
-              <a:t>2010</a:t>
-            </a:r>
-            <a:r>
-              <a:rPr lang="en-NZ" b="1" dirty="0" smtClean="0">
-                <a:solidFill>
-                  <a:schemeClr val="tx1"/>
-                </a:solidFill>
-              </a:rPr>
-              <a:t>:</a:t>
+              <a:t>Brief presentation</a:t>
             </a:r>
           </a:p>
           <a:p>
@@ -6367,7 +6246,7 @@
                   </a:schemeClr>
                 </a:solidFill>
               </a:rPr>
-              <a:t>Started as a javascript port of XHP.</a:t>
+              <a:t>Overview of history, purpose, who’s using it</a:t>
             </a:r>
           </a:p>
           <a:p>
@@ -6377,77 +6256,78 @@
                   <a:schemeClr val="tx1"/>
                 </a:solidFill>
               </a:rPr>
-              <a:t>2011:</a:t>
-            </a:r>
-          </a:p>
-          <a:p>
-            <a:r>
-              <a:rPr lang="en-NZ" dirty="0" smtClean="0">
-                <a:solidFill>
-                  <a:schemeClr val="tx2">
-                    <a:lumMod val="40000"/>
-                    <a:lumOff val="60000"/>
-                  </a:schemeClr>
-                </a:solidFill>
-              </a:rPr>
-              <a:t>Jordan Walke created “FaxJS” – an early prototype for React</a:t>
-            </a:r>
-          </a:p>
-          <a:p>
-            <a:r>
-              <a:rPr lang="en-NZ" b="1" dirty="0" smtClean="0">
-                <a:solidFill>
-                  <a:schemeClr val="tx1"/>
-                </a:solidFill>
-              </a:rPr>
-              <a:t>2012:</a:t>
-            </a:r>
-          </a:p>
-          <a:p>
-            <a:r>
-              <a:rPr lang="en-NZ" dirty="0" smtClean="0">
-                <a:solidFill>
-                  <a:schemeClr val="tx2">
-                    <a:lumMod val="40000"/>
-                    <a:lumOff val="60000"/>
-                  </a:schemeClr>
-                </a:solidFill>
-              </a:rPr>
-              <a:t>React was born! Created originally as a solution to manage Facebook Ads</a:t>
-            </a:r>
-          </a:p>
-          <a:p>
-            <a:r>
-              <a:rPr lang="en-NZ" dirty="0" smtClean="0">
-                <a:solidFill>
-                  <a:schemeClr val="tx2">
-                    <a:lumMod val="40000"/>
-                    <a:lumOff val="60000"/>
-                  </a:schemeClr>
-                </a:solidFill>
-              </a:rPr>
-              <a:t>Instagram expressed interest in using React</a:t>
-            </a:r>
-          </a:p>
-          <a:p>
-            <a:r>
-              <a:rPr lang="en-NZ" dirty="0" smtClean="0">
-                <a:solidFill>
-                  <a:schemeClr val="tx2">
-                    <a:lumMod val="40000"/>
-                    <a:lumOff val="60000"/>
-                  </a:schemeClr>
-                </a:solidFill>
-              </a:rPr>
-              <a:t>Facebook made plans to open source</a:t>
-            </a:r>
-          </a:p>
-          <a:p>
+              <a:t>2) Live demo – How to install / create basic component</a:t>
+            </a:r>
             <a:endParaRPr lang="en-NZ" b="1" dirty="0">
               <a:solidFill>
                 <a:schemeClr val="tx1"/>
               </a:solidFill>
             </a:endParaRPr>
+          </a:p>
+          <a:p>
+            <a:r>
+              <a:rPr lang="en-NZ" dirty="0" smtClean="0">
+                <a:solidFill>
+                  <a:schemeClr val="tx2">
+                    <a:lumMod val="40000"/>
+                    <a:lumOff val="60000"/>
+                  </a:schemeClr>
+                </a:solidFill>
+              </a:rPr>
+              <a:t>Install CRA using NPM</a:t>
+            </a:r>
+          </a:p>
+          <a:p>
+            <a:r>
+              <a:rPr lang="en-NZ" dirty="0" smtClean="0">
+                <a:solidFill>
+                  <a:schemeClr val="tx2">
+                    <a:lumMod val="40000"/>
+                    <a:lumOff val="60000"/>
+                  </a:schemeClr>
+                </a:solidFill>
+              </a:rPr>
+              <a:t>Create a basic counter component</a:t>
+            </a:r>
+          </a:p>
+          <a:p>
+            <a:r>
+              <a:rPr lang="en-NZ" b="1" dirty="0" smtClean="0">
+                <a:solidFill>
+                  <a:schemeClr val="tx1"/>
+                </a:solidFill>
+              </a:rPr>
+              <a:t>3) Walk through of a react/</a:t>
+            </a:r>
+            <a:r>
+              <a:rPr lang="en-NZ" b="1" dirty="0" err="1" smtClean="0">
+                <a:solidFill>
+                  <a:schemeClr val="tx1"/>
+                </a:solidFill>
+              </a:rPr>
+              <a:t>redux</a:t>
+            </a:r>
+            <a:r>
+              <a:rPr lang="en-NZ" b="1" dirty="0" smtClean="0">
+                <a:solidFill>
+                  <a:schemeClr val="tx1"/>
+                </a:solidFill>
+              </a:rPr>
+              <a:t> project</a:t>
+            </a:r>
+          </a:p>
+          <a:p>
+            <a:r>
+              <a:rPr lang="en-NZ" dirty="0" smtClean="0">
+                <a:solidFill>
+                  <a:schemeClr val="tx2">
+                    <a:lumMod val="40000"/>
+                    <a:lumOff val="60000"/>
+                  </a:schemeClr>
+                </a:solidFill>
+              </a:rPr>
+              <a:t>Walk through of a slightly larger project</a:t>
+            </a:r>
           </a:p>
         </p:txBody>
       </p:sp>
@@ -6553,15 +6433,7 @@
                   <a:schemeClr val="tx1"/>
                 </a:solidFill>
               </a:rPr>
-              <a:t>2013</a:t>
-            </a:r>
-            <a:r>
-              <a:rPr lang="en-NZ" b="1" dirty="0" smtClean="0">
-                <a:solidFill>
-                  <a:schemeClr val="tx1"/>
-                </a:solidFill>
-              </a:rPr>
-              <a:t>:</a:t>
+              <a:t>2010:</a:t>
             </a:r>
           </a:p>
           <a:p>
@@ -6574,7 +6446,17 @@
                   </a:schemeClr>
                 </a:solidFill>
               </a:rPr>
-              <a:t>React goes open source </a:t>
+              <a:t>Started as a javascript port of XHP.</a:t>
+            </a:r>
+          </a:p>
+          <a:p>
+            <a:r>
+              <a:rPr lang="en-NZ" b="1" dirty="0" smtClean="0">
+                <a:solidFill>
+                  <a:schemeClr val="tx1"/>
+                </a:solidFill>
+              </a:rPr>
+              <a:t>2011:</a:t>
             </a:r>
           </a:p>
           <a:p>
@@ -6587,7 +6469,7 @@
                   </a:schemeClr>
                 </a:solidFill>
               </a:rPr>
-              <a:t>Early adopters didn’t like the idea of React</a:t>
+              <a:t>Jordan Walke created “FaxJS” – an early prototype for React</a:t>
             </a:r>
           </a:p>
           <a:p>
@@ -6597,7 +6479,7 @@
                   <a:schemeClr val="tx1"/>
                 </a:solidFill>
               </a:rPr>
-              <a:t>2015:</a:t>
+              <a:t>2012:</a:t>
             </a:r>
           </a:p>
           <a:p>
@@ -6610,33 +6492,48 @@
                   </a:schemeClr>
                 </a:solidFill>
               </a:rPr>
-              <a:t>React is labelled as ‘stable’ by Facebook</a:t>
-            </a:r>
+              <a:t>React was born! Created originally as a solution to manage Facebook Ads</a:t>
+            </a:r>
+          </a:p>
+          <a:p>
+            <a:r>
+              <a:rPr lang="en-NZ" dirty="0" smtClean="0">
+                <a:solidFill>
+                  <a:schemeClr val="tx2">
+                    <a:lumMod val="40000"/>
+                    <a:lumOff val="60000"/>
+                  </a:schemeClr>
+                </a:solidFill>
+              </a:rPr>
+              <a:t>Instagram expressed interest in using React</a:t>
+            </a:r>
+          </a:p>
+          <a:p>
+            <a:r>
+              <a:rPr lang="en-NZ" dirty="0" smtClean="0">
+                <a:solidFill>
+                  <a:schemeClr val="tx2">
+                    <a:lumMod val="40000"/>
+                    <a:lumOff val="60000"/>
+                  </a:schemeClr>
+                </a:solidFill>
+              </a:rPr>
+              <a:t>Facebook made plans to open source</a:t>
+            </a:r>
+          </a:p>
+          <a:p>
             <a:endParaRPr lang="en-NZ" b="1" dirty="0">
               <a:solidFill>
                 <a:schemeClr val="tx1"/>
               </a:solidFill>
             </a:endParaRPr>
           </a:p>
-          <a:p>
-            <a:r>
-              <a:rPr lang="en-NZ" dirty="0" smtClean="0">
-                <a:solidFill>
-                  <a:schemeClr val="tx2">
-                    <a:lumMod val="40000"/>
-                    <a:lumOff val="60000"/>
-                  </a:schemeClr>
-                </a:solidFill>
-              </a:rPr>
-              <a:t>Large companies such as Netflix &amp; Airbnb start using React</a:t>
-            </a:r>
-          </a:p>
         </p:txBody>
       </p:sp>
     </p:spTree>
     <p:extLst>
       <p:ext uri="{BB962C8B-B14F-4D97-AF65-F5344CB8AC3E}">
-        <p14:creationId xmlns:p14="http://schemas.microsoft.com/office/powerpoint/2010/main" val="1877736308"/>
+        <p14:creationId xmlns:p14="http://schemas.microsoft.com/office/powerpoint/2010/main" val="4181066389"/>
       </p:ext>
     </p:extLst>
   </p:cSld>
@@ -6694,7 +6591,7 @@
               <a:rPr lang="en-NZ" dirty="0" smtClean="0">
                 <a:latin typeface="Imprint MT Shadow" panose="04020605060303030202" pitchFamily="82" charset="0"/>
               </a:rPr>
-              <a:t>Purpose</a:t>
+              <a:t>History</a:t>
             </a:r>
             <a:endParaRPr lang="en-NZ" dirty="0">
               <a:latin typeface="Imprint MT Shadow" panose="04020605060303030202" pitchFamily="82" charset="0"/>
@@ -6722,14 +6619,21 @@
           <a:bodyPr/>
           <a:lstStyle/>
           <a:p>
-            <a:endParaRPr lang="en-NZ" dirty="0" smtClean="0">
+            <a:endParaRPr lang="en-NZ" b="1" dirty="0" smtClean="0">
               <a:solidFill>
-                <a:schemeClr val="tx2">
-                  <a:lumMod val="40000"/>
-                  <a:lumOff val="60000"/>
-                </a:schemeClr>
+                <a:schemeClr val="tx1"/>
               </a:solidFill>
             </a:endParaRPr>
+          </a:p>
+          <a:p>
+            <a:r>
+              <a:rPr lang="en-NZ" b="1" dirty="0" smtClean="0">
+                <a:solidFill>
+                  <a:schemeClr val="tx1"/>
+                </a:solidFill>
+              </a:rPr>
+              <a:t>2013:</a:t>
+            </a:r>
           </a:p>
           <a:p>
             <a:r>
@@ -6741,8 +6645,10 @@
                   </a:schemeClr>
                 </a:solidFill>
               </a:rPr>
-              <a:t>Creating </a:t>
-            </a:r>
+              <a:t>React goes open source </a:t>
+            </a:r>
+          </a:p>
+          <a:p>
             <a:r>
               <a:rPr lang="en-NZ" dirty="0" smtClean="0">
                 <a:solidFill>
@@ -6752,10 +6658,22 @@
                   </a:schemeClr>
                 </a:solidFill>
               </a:rPr>
-              <a:t>user interfaces (M</a:t>
-            </a:r>
+              <a:t>Early adopters didn’t like the idea of React</a:t>
+            </a:r>
+          </a:p>
+          <a:p>
             <a:r>
               <a:rPr lang="en-NZ" b="1" dirty="0" smtClean="0">
+                <a:solidFill>
+                  <a:schemeClr val="tx1"/>
+                </a:solidFill>
+              </a:rPr>
+              <a:t>2015:</a:t>
+            </a:r>
+          </a:p>
+          <a:p>
+            <a:r>
+              <a:rPr lang="en-NZ" dirty="0" smtClean="0">
                 <a:solidFill>
                   <a:schemeClr val="tx2">
                     <a:lumMod val="40000"/>
@@ -6763,8 +6681,15 @@
                   </a:schemeClr>
                 </a:solidFill>
               </a:rPr>
-              <a:t>V</a:t>
-            </a:r>
+              <a:t>React is labelled as ‘stable’ by Facebook</a:t>
+            </a:r>
+            <a:endParaRPr lang="en-NZ" b="1" dirty="0">
+              <a:solidFill>
+                <a:schemeClr val="tx1"/>
+              </a:solidFill>
+            </a:endParaRPr>
+          </a:p>
+          <a:p>
             <a:r>
               <a:rPr lang="en-NZ" dirty="0" smtClean="0">
                 <a:solidFill>
@@ -6774,51 +6699,15 @@
                   </a:schemeClr>
                 </a:solidFill>
               </a:rPr>
-              <a:t>C)</a:t>
-            </a:r>
-          </a:p>
-          <a:p>
-            <a:r>
-              <a:rPr lang="en-NZ" dirty="0" smtClean="0">
-                <a:solidFill>
-                  <a:schemeClr val="tx2">
-                    <a:lumMod val="40000"/>
-                    <a:lumOff val="60000"/>
-                  </a:schemeClr>
-                </a:solidFill>
-              </a:rPr>
-              <a:t>Building large applications with data that changes over time</a:t>
-            </a:r>
-          </a:p>
-          <a:p>
-            <a:r>
-              <a:rPr lang="en-NZ" dirty="0" smtClean="0">
-                <a:solidFill>
-                  <a:schemeClr val="tx2">
-                    <a:lumMod val="40000"/>
-                    <a:lumOff val="60000"/>
-                  </a:schemeClr>
-                </a:solidFill>
-              </a:rPr>
-              <a:t>Building something that requires a lot of DOM interactions &amp; requires that process to be fast.</a:t>
-            </a:r>
-          </a:p>
-          <a:p>
-            <a:endParaRPr lang="en-NZ" dirty="0" smtClean="0">
-              <a:solidFill>
-                <a:schemeClr val="tx2">
-                  <a:lumMod val="40000"/>
-                  <a:lumOff val="60000"/>
-                </a:schemeClr>
-              </a:solidFill>
-            </a:endParaRPr>
+              <a:t>Large companies such as Netflix &amp; Airbnb start using React</a:t>
+            </a:r>
           </a:p>
         </p:txBody>
       </p:sp>
     </p:spTree>
     <p:extLst>
       <p:ext uri="{BB962C8B-B14F-4D97-AF65-F5344CB8AC3E}">
-        <p14:creationId xmlns:p14="http://schemas.microsoft.com/office/powerpoint/2010/main" val="1860393529"/>
+        <p14:creationId xmlns:p14="http://schemas.microsoft.com/office/powerpoint/2010/main" val="1877736308"/>
       </p:ext>
     </p:extLst>
   </p:cSld>
@@ -6876,7 +6765,7 @@
               <a:rPr lang="en-NZ" dirty="0" smtClean="0">
                 <a:latin typeface="Imprint MT Shadow" panose="04020605060303030202" pitchFamily="82" charset="0"/>
               </a:rPr>
-              <a:t>Who’s using react?</a:t>
+              <a:t>Purpose</a:t>
             </a:r>
             <a:endParaRPr lang="en-NZ" dirty="0">
               <a:latin typeface="Imprint MT Shadow" panose="04020605060303030202" pitchFamily="82" charset="0"/>
@@ -6904,10 +6793,6 @@
           <a:bodyPr/>
           <a:lstStyle/>
           <a:p>
-            <a:pPr marL="342900" indent="-342900">
-              <a:buFont typeface="Arial" panose="020B0604020202020204" pitchFamily="34" charset="0"/>
-              <a:buChar char="•"/>
-            </a:pPr>
             <a:endParaRPr lang="en-NZ" dirty="0" smtClean="0">
               <a:solidFill>
                 <a:schemeClr val="tx2">
@@ -6918,10 +6803,6 @@
             </a:endParaRPr>
           </a:p>
           <a:p>
-            <a:pPr marL="342900" indent="-342900">
-              <a:buFont typeface="Arial" panose="020B0604020202020204" pitchFamily="34" charset="0"/>
-              <a:buChar char="•"/>
-            </a:pPr>
             <a:r>
               <a:rPr lang="en-NZ" dirty="0" smtClean="0">
                 <a:solidFill>
@@ -6931,16 +6812,10 @@
                   </a:schemeClr>
                 </a:solidFill>
               </a:rPr>
-              <a:t>Facebook</a:t>
-            </a:r>
-          </a:p>
-          <a:p>
-            <a:pPr marL="342900" indent="-342900">
-              <a:buFont typeface="Arial" panose="020B0604020202020204" pitchFamily="34" charset="0"/>
-              <a:buChar char="•"/>
-            </a:pPr>
-            <a:r>
-              <a:rPr lang="en-NZ" dirty="0" smtClean="0">
+              <a:t>Creating user interfaces (M</a:t>
+            </a:r>
+            <a:r>
+              <a:rPr lang="en-NZ" b="1" dirty="0" smtClean="0">
                 <a:solidFill>
                   <a:schemeClr val="tx2">
                     <a:lumMod val="40000"/>
@@ -6948,14 +6823,8 @@
                   </a:schemeClr>
                 </a:solidFill>
               </a:rPr>
-              <a:t>Netflix</a:t>
-            </a:r>
-          </a:p>
-          <a:p>
-            <a:pPr marL="342900" indent="-342900">
-              <a:buFont typeface="Arial" panose="020B0604020202020204" pitchFamily="34" charset="0"/>
-              <a:buChar char="•"/>
-            </a:pPr>
+              <a:t>V</a:t>
+            </a:r>
             <a:r>
               <a:rPr lang="en-NZ" dirty="0" smtClean="0">
                 <a:solidFill>
@@ -6965,14 +6834,10 @@
                   </a:schemeClr>
                 </a:solidFill>
               </a:rPr>
-              <a:t>Instagram</a:t>
-            </a:r>
-          </a:p>
-          <a:p>
-            <a:pPr marL="342900" indent="-342900">
-              <a:buFont typeface="Arial" panose="020B0604020202020204" pitchFamily="34" charset="0"/>
-              <a:buChar char="•"/>
-            </a:pPr>
+              <a:t>C)</a:t>
+            </a:r>
+          </a:p>
+          <a:p>
             <a:r>
               <a:rPr lang="en-NZ" dirty="0" smtClean="0">
                 <a:solidFill>
@@ -6982,14 +6847,10 @@
                   </a:schemeClr>
                 </a:solidFill>
               </a:rPr>
-              <a:t>Dropbox</a:t>
-            </a:r>
-          </a:p>
-          <a:p>
-            <a:pPr marL="342900" indent="-342900">
-              <a:buFont typeface="Arial" panose="020B0604020202020204" pitchFamily="34" charset="0"/>
-              <a:buChar char="•"/>
-            </a:pPr>
+              <a:t>Building large applications with data that changes over time</a:t>
+            </a:r>
+          </a:p>
+          <a:p>
             <a:r>
               <a:rPr lang="en-NZ" dirty="0" smtClean="0">
                 <a:solidFill>
@@ -6999,42 +6860,10 @@
                   </a:schemeClr>
                 </a:solidFill>
               </a:rPr>
-              <a:t>WhatsApp</a:t>
-            </a:r>
-          </a:p>
-          <a:p>
-            <a:pPr marL="342900" indent="-342900">
-              <a:buFont typeface="Arial" panose="020B0604020202020204" pitchFamily="34" charset="0"/>
-              <a:buChar char="•"/>
-            </a:pPr>
-            <a:r>
-              <a:rPr lang="en-NZ" dirty="0" smtClean="0">
-                <a:solidFill>
-                  <a:schemeClr val="tx2">
-                    <a:lumMod val="40000"/>
-                    <a:lumOff val="60000"/>
-                  </a:schemeClr>
-                </a:solidFill>
-              </a:rPr>
-              <a:t>The New York Times</a:t>
-            </a:r>
-          </a:p>
-          <a:p>
-            <a:pPr marL="342900" indent="-342900">
-              <a:buFont typeface="Arial" panose="020B0604020202020204" pitchFamily="34" charset="0"/>
-              <a:buChar char="•"/>
-            </a:pPr>
-            <a:r>
-              <a:rPr lang="en-NZ" dirty="0" smtClean="0">
-                <a:solidFill>
-                  <a:schemeClr val="tx2">
-                    <a:lumMod val="40000"/>
-                    <a:lumOff val="60000"/>
-                  </a:schemeClr>
-                </a:solidFill>
-              </a:rPr>
-              <a:t>And many more…</a:t>
-            </a:r>
+              <a:t>Building something that requires a lot of DOM interactions &amp; requires that process to be fast.</a:t>
+            </a:r>
+          </a:p>
+          <a:p>
             <a:endParaRPr lang="en-NZ" dirty="0" smtClean="0">
               <a:solidFill>
                 <a:schemeClr val="tx2">
@@ -7049,7 +6878,7 @@
     </p:spTree>
     <p:extLst>
       <p:ext uri="{BB962C8B-B14F-4D97-AF65-F5344CB8AC3E}">
-        <p14:creationId xmlns:p14="http://schemas.microsoft.com/office/powerpoint/2010/main" val="70031786"/>
+        <p14:creationId xmlns:p14="http://schemas.microsoft.com/office/powerpoint/2010/main" val="1860393529"/>
       </p:ext>
     </p:extLst>
   </p:cSld>
@@ -7100,18 +6929,16 @@
           </a:xfrm>
         </p:spPr>
         <p:txBody>
-          <a:bodyPr>
-            <a:normAutofit/>
-          </a:bodyPr>
-          <a:lstStyle/>
-          <a:p>
-            <a:r>
-              <a:rPr lang="en-NZ" sz="4000" dirty="0" smtClean="0">
+          <a:bodyPr/>
+          <a:lstStyle/>
+          <a:p>
+            <a:r>
+              <a:rPr lang="en-NZ" dirty="0" smtClean="0">
                 <a:latin typeface="Imprint MT Shadow" panose="04020605060303030202" pitchFamily="82" charset="0"/>
               </a:rPr>
-              <a:t>Why should I use react?</a:t>
-            </a:r>
-            <a:endParaRPr lang="en-NZ" sz="4000" dirty="0">
+              <a:t>Who’s using react?</a:t>
+            </a:r>
+            <a:endParaRPr lang="en-NZ" dirty="0">
               <a:latin typeface="Imprint MT Shadow" panose="04020605060303030202" pitchFamily="82" charset="0"/>
             </a:endParaRPr>
           </a:p>
@@ -7164,7 +6991,7 @@
                   </a:schemeClr>
                 </a:solidFill>
               </a:rPr>
-              <a:t>Rendering and optimization (Virtual DOM)</a:t>
+              <a:t>Facebook</a:t>
             </a:r>
           </a:p>
           <a:p>
@@ -7181,7 +7008,125 @@
                   </a:schemeClr>
                 </a:solidFill>
               </a:rPr>
-              <a:t>Component based structure</a:t>
+              <a:t>Netflix</a:t>
+            </a:r>
+          </a:p>
+          <a:p>
+            <a:pPr marL="342900" indent="-342900">
+              <a:buFont typeface="Arial" panose="020B0604020202020204" pitchFamily="34" charset="0"/>
+              <a:buChar char="•"/>
+            </a:pPr>
+            <a:r>
+              <a:rPr lang="en-NZ" dirty="0" smtClean="0">
+                <a:solidFill>
+                  <a:schemeClr val="tx2">
+                    <a:lumMod val="40000"/>
+                    <a:lumOff val="60000"/>
+                  </a:schemeClr>
+                </a:solidFill>
+              </a:rPr>
+              <a:t>Instagram</a:t>
+            </a:r>
+          </a:p>
+          <a:p>
+            <a:pPr marL="342900" indent="-342900">
+              <a:buFont typeface="Arial" panose="020B0604020202020204" pitchFamily="34" charset="0"/>
+              <a:buChar char="•"/>
+            </a:pPr>
+            <a:r>
+              <a:rPr lang="en-NZ" dirty="0" smtClean="0">
+                <a:solidFill>
+                  <a:schemeClr val="tx2">
+                    <a:lumMod val="40000"/>
+                    <a:lumOff val="60000"/>
+                  </a:schemeClr>
+                </a:solidFill>
+              </a:rPr>
+              <a:t>Dropbox</a:t>
+            </a:r>
+          </a:p>
+          <a:p>
+            <a:pPr marL="342900" indent="-342900">
+              <a:buFont typeface="Arial" panose="020B0604020202020204" pitchFamily="34" charset="0"/>
+              <a:buChar char="•"/>
+            </a:pPr>
+            <a:r>
+              <a:rPr lang="en-NZ" dirty="0" smtClean="0">
+                <a:solidFill>
+                  <a:schemeClr val="tx2">
+                    <a:lumMod val="40000"/>
+                    <a:lumOff val="60000"/>
+                  </a:schemeClr>
+                </a:solidFill>
+              </a:rPr>
+              <a:t>WhatsApp</a:t>
+            </a:r>
+          </a:p>
+          <a:p>
+            <a:pPr marL="342900" indent="-342900">
+              <a:buFont typeface="Arial" panose="020B0604020202020204" pitchFamily="34" charset="0"/>
+              <a:buChar char="•"/>
+            </a:pPr>
+            <a:r>
+              <a:rPr lang="en-NZ" dirty="0" smtClean="0">
+                <a:solidFill>
+                  <a:schemeClr val="tx2">
+                    <a:lumMod val="40000"/>
+                    <a:lumOff val="60000"/>
+                  </a:schemeClr>
+                </a:solidFill>
+              </a:rPr>
+              <a:t>The New York </a:t>
+            </a:r>
+            <a:r>
+              <a:rPr lang="en-NZ" dirty="0" smtClean="0">
+                <a:solidFill>
+                  <a:schemeClr val="tx2">
+                    <a:lumMod val="40000"/>
+                    <a:lumOff val="60000"/>
+                  </a:schemeClr>
+                </a:solidFill>
+              </a:rPr>
+              <a:t>Times</a:t>
+            </a:r>
+          </a:p>
+          <a:p>
+            <a:pPr marL="342900" indent="-342900">
+              <a:buFont typeface="Arial" panose="020B0604020202020204" pitchFamily="34" charset="0"/>
+              <a:buChar char="•"/>
+            </a:pPr>
+            <a:r>
+              <a:rPr lang="en-NZ" dirty="0" smtClean="0">
+                <a:solidFill>
+                  <a:schemeClr val="tx2">
+                    <a:lumMod val="40000"/>
+                    <a:lumOff val="60000"/>
+                  </a:schemeClr>
+                </a:solidFill>
+              </a:rPr>
+              <a:t>Discord (React native for </a:t>
+            </a:r>
+            <a:r>
+              <a:rPr lang="en-NZ" dirty="0" err="1" smtClean="0">
+                <a:solidFill>
+                  <a:schemeClr val="tx2">
+                    <a:lumMod val="40000"/>
+                    <a:lumOff val="60000"/>
+                  </a:schemeClr>
+                </a:solidFill>
+              </a:rPr>
+              <a:t>ios</a:t>
+            </a:r>
+            <a:r>
+              <a:rPr lang="en-NZ" dirty="0" smtClean="0">
+                <a:solidFill>
+                  <a:schemeClr val="tx2">
+                    <a:lumMod val="40000"/>
+                    <a:lumOff val="60000"/>
+                  </a:schemeClr>
+                </a:solidFill>
+              </a:rPr>
+              <a:t>)</a:t>
             </a:r>
             <a:endParaRPr lang="en-NZ" dirty="0" smtClean="0">
               <a:solidFill>
@@ -7192,12 +7137,29 @@
               </a:solidFill>
             </a:endParaRPr>
           </a:p>
+          <a:p>
+            <a:pPr marL="342900" indent="-342900">
+              <a:buFont typeface="Arial" panose="020B0604020202020204" pitchFamily="34" charset="0"/>
+              <a:buChar char="•"/>
+            </a:pPr>
+            <a:r>
+              <a:rPr lang="en-NZ" dirty="0" smtClean="0">
+                <a:solidFill>
+                  <a:schemeClr val="tx2">
+                    <a:lumMod val="40000"/>
+                    <a:lumOff val="60000"/>
+                  </a:schemeClr>
+                </a:solidFill>
+              </a:rPr>
+              <a:t>And many more…</a:t>
+            </a:r>
+          </a:p>
         </p:txBody>
       </p:sp>
     </p:spTree>
     <p:extLst>
       <p:ext uri="{BB962C8B-B14F-4D97-AF65-F5344CB8AC3E}">
-        <p14:creationId xmlns:p14="http://schemas.microsoft.com/office/powerpoint/2010/main" val="666344581"/>
+        <p14:creationId xmlns:p14="http://schemas.microsoft.com/office/powerpoint/2010/main" val="70031786"/>
       </p:ext>
     </p:extLst>
   </p:cSld>
@@ -7255,22 +7217,12 @@
           <a:p>
             <a:r>
               <a:rPr lang="en-NZ" sz="4000" dirty="0" smtClean="0">
-                <a:solidFill>
-                  <a:schemeClr val="tx2">
-                    <a:lumMod val="40000"/>
-                    <a:lumOff val="60000"/>
-                  </a:schemeClr>
-                </a:solidFill>
+                <a:latin typeface="Imprint MT Shadow" panose="04020605060303030202" pitchFamily="82" charset="0"/>
               </a:rPr>
-              <a:t>Quick Virtual DOM</a:t>
+              <a:t>Benefits</a:t>
             </a:r>
             <a:endParaRPr lang="en-NZ" sz="4000" dirty="0">
-              <a:solidFill>
-                <a:schemeClr val="tx2">
-                  <a:lumMod val="40000"/>
-                  <a:lumOff val="60000"/>
-                </a:schemeClr>
-              </a:solidFill>
+              <a:latin typeface="Imprint MT Shadow" panose="04020605060303030202" pitchFamily="82" charset="0"/>
             </a:endParaRPr>
           </a:p>
         </p:txBody>
@@ -7292,9 +7244,150 @@
           </a:xfrm>
         </p:spPr>
         <p:txBody>
-          <a:bodyPr/>
-          <a:lstStyle/>
-          <a:p>
+          <a:bodyPr>
+            <a:normAutofit fontScale="85000" lnSpcReduction="20000"/>
+          </a:bodyPr>
+          <a:lstStyle/>
+          <a:p>
+            <a:pPr marL="342900" indent="-342900">
+              <a:buFont typeface="Arial" panose="020B0604020202020204" pitchFamily="34" charset="0"/>
+              <a:buChar char="•"/>
+            </a:pPr>
+            <a:endParaRPr lang="en-NZ" dirty="0" smtClean="0">
+              <a:solidFill>
+                <a:schemeClr val="tx1"/>
+              </a:solidFill>
+            </a:endParaRPr>
+          </a:p>
+          <a:p>
+            <a:r>
+              <a:rPr lang="en-NZ" b="1" dirty="0" smtClean="0">
+                <a:solidFill>
+                  <a:schemeClr val="tx1"/>
+                </a:solidFill>
+              </a:rPr>
+              <a:t>1</a:t>
+            </a:r>
+            <a:r>
+              <a:rPr lang="en-NZ" b="1" dirty="0" smtClean="0">
+                <a:solidFill>
+                  <a:schemeClr val="tx1"/>
+                </a:solidFill>
+              </a:rPr>
+              <a:t>) Component </a:t>
+            </a:r>
+            <a:r>
+              <a:rPr lang="en-NZ" b="1" dirty="0" smtClean="0">
+                <a:solidFill>
+                  <a:schemeClr val="tx1"/>
+                </a:solidFill>
+              </a:rPr>
+              <a:t>based </a:t>
+            </a:r>
+            <a:r>
+              <a:rPr lang="en-NZ" b="1" dirty="0" smtClean="0">
+                <a:solidFill>
+                  <a:schemeClr val="tx1"/>
+                </a:solidFill>
+              </a:rPr>
+              <a:t>structure</a:t>
+            </a:r>
+          </a:p>
+          <a:p>
+            <a:r>
+              <a:rPr lang="en-NZ" dirty="0">
+                <a:solidFill>
+                  <a:schemeClr val="tx2">
+                    <a:lumMod val="40000"/>
+                    <a:lumOff val="60000"/>
+                  </a:schemeClr>
+                </a:solidFill>
+              </a:rPr>
+              <a:t>Easily re-use components anywhere on your site</a:t>
+            </a:r>
+          </a:p>
+          <a:p>
+            <a:r>
+              <a:rPr lang="en-NZ" dirty="0">
+                <a:solidFill>
+                  <a:schemeClr val="tx2">
+                    <a:lumMod val="40000"/>
+                    <a:lumOff val="60000"/>
+                  </a:schemeClr>
+                </a:solidFill>
+              </a:rPr>
+              <a:t>Create components for </a:t>
+            </a:r>
+            <a:r>
+              <a:rPr lang="en-NZ" dirty="0" smtClean="0">
+                <a:solidFill>
+                  <a:schemeClr val="tx2">
+                    <a:lumMod val="40000"/>
+                    <a:lumOff val="60000"/>
+                  </a:schemeClr>
+                </a:solidFill>
+              </a:rPr>
+              <a:t>anything</a:t>
+            </a:r>
+          </a:p>
+          <a:p>
+            <a:r>
+              <a:rPr lang="en-NZ" dirty="0" smtClean="0">
+                <a:solidFill>
+                  <a:schemeClr val="tx2">
+                    <a:lumMod val="40000"/>
+                    <a:lumOff val="60000"/>
+                  </a:schemeClr>
+                </a:solidFill>
+              </a:rPr>
+              <a:t>Smart </a:t>
+            </a:r>
+            <a:r>
+              <a:rPr lang="en-NZ" dirty="0">
+                <a:solidFill>
+                  <a:schemeClr val="tx2">
+                    <a:lumMod val="40000"/>
+                    <a:lumOff val="60000"/>
+                  </a:schemeClr>
+                </a:solidFill>
+              </a:rPr>
+              <a:t>components / Dumb </a:t>
+            </a:r>
+            <a:r>
+              <a:rPr lang="en-NZ" dirty="0" smtClean="0">
+                <a:solidFill>
+                  <a:schemeClr val="tx2">
+                    <a:lumMod val="40000"/>
+                    <a:lumOff val="60000"/>
+                  </a:schemeClr>
+                </a:solidFill>
+              </a:rPr>
+              <a:t>components</a:t>
+            </a:r>
+          </a:p>
+          <a:p>
+            <a:r>
+              <a:rPr lang="en-NZ" dirty="0" smtClean="0">
+                <a:solidFill>
+                  <a:schemeClr val="tx2">
+                    <a:lumMod val="40000"/>
+                    <a:lumOff val="60000"/>
+                  </a:schemeClr>
+                </a:solidFill>
+              </a:rPr>
+              <a:t>Makes </a:t>
+            </a:r>
+            <a:r>
+              <a:rPr lang="en-NZ" dirty="0">
+                <a:solidFill>
+                  <a:schemeClr val="tx2">
+                    <a:lumMod val="40000"/>
+                    <a:lumOff val="60000"/>
+                  </a:schemeClr>
+                </a:solidFill>
+              </a:rPr>
+              <a:t>it easier to develop your code base </a:t>
+            </a:r>
             <a:endParaRPr lang="en-NZ" dirty="0" smtClean="0">
               <a:solidFill>
                 <a:schemeClr val="tx2">
@@ -7314,8 +7407,171 @@
                   </a:schemeClr>
                 </a:solidFill>
               </a:rPr>
+              <a:t>and </a:t>
+            </a:r>
+            <a:r>
+              <a:rPr lang="en-NZ" dirty="0">
+                <a:solidFill>
+                  <a:schemeClr val="tx2">
+                    <a:lumMod val="40000"/>
+                    <a:lumOff val="60000"/>
+                  </a:schemeClr>
+                </a:solidFill>
+              </a:rPr>
+              <a:t>keep things </a:t>
+            </a:r>
+            <a:r>
+              <a:rPr lang="en-NZ" dirty="0" smtClean="0">
+                <a:solidFill>
+                  <a:schemeClr val="tx2">
+                    <a:lumMod val="40000"/>
+                    <a:lumOff val="60000"/>
+                  </a:schemeClr>
+                </a:solidFill>
+              </a:rPr>
+              <a:t>clean</a:t>
+            </a:r>
+          </a:p>
+          <a:p>
+            <a:endParaRPr lang="en-NZ" dirty="0" smtClean="0">
+              <a:solidFill>
+                <a:schemeClr val="tx2">
+                  <a:lumMod val="40000"/>
+                  <a:lumOff val="60000"/>
+                </a:schemeClr>
+              </a:solidFill>
+            </a:endParaRPr>
+          </a:p>
+          <a:p>
+            <a:r>
+              <a:rPr lang="en-NZ" b="1" dirty="0">
+                <a:solidFill>
+                  <a:schemeClr val="tx1"/>
+                </a:solidFill>
+              </a:rPr>
+              <a:t>2) Rendering and optimization (Virtual DOM)</a:t>
+            </a:r>
+          </a:p>
+          <a:p>
+            <a:r>
+              <a:rPr lang="en-NZ" dirty="0">
+                <a:solidFill>
+                  <a:schemeClr val="tx2">
+                    <a:lumMod val="40000"/>
+                    <a:lumOff val="60000"/>
+                  </a:schemeClr>
+                </a:solidFill>
+              </a:rPr>
               <a:t>Every time react is updated…</a:t>
             </a:r>
+          </a:p>
+          <a:p>
+            <a:r>
+              <a:rPr lang="en-NZ" dirty="0">
+                <a:solidFill>
+                  <a:schemeClr val="tx2">
+                    <a:lumMod val="40000"/>
+                    <a:lumOff val="60000"/>
+                  </a:schemeClr>
+                </a:solidFill>
+              </a:rPr>
+              <a:t>React builds a new virtual DOM tree</a:t>
+            </a:r>
+          </a:p>
+          <a:p>
+            <a:r>
+              <a:rPr lang="en-NZ" dirty="0">
+                <a:solidFill>
+                  <a:schemeClr val="tx2">
+                    <a:lumMod val="40000"/>
+                    <a:lumOff val="60000"/>
+                  </a:schemeClr>
+                </a:solidFill>
+              </a:rPr>
+              <a:t>Diff’s it with the old tree (similar to </a:t>
+            </a:r>
+            <a:r>
+              <a:rPr lang="en-NZ" dirty="0" smtClean="0">
+                <a:solidFill>
+                  <a:schemeClr val="tx2">
+                    <a:lumMod val="40000"/>
+                    <a:lumOff val="60000"/>
+                  </a:schemeClr>
+                </a:solidFill>
+              </a:rPr>
+              <a:t>git)</a:t>
+            </a:r>
+          </a:p>
+          <a:p>
+            <a:r>
+              <a:rPr lang="en-NZ" dirty="0" smtClean="0">
+                <a:solidFill>
+                  <a:schemeClr val="tx2">
+                    <a:lumMod val="40000"/>
+                    <a:lumOff val="60000"/>
+                  </a:schemeClr>
+                </a:solidFill>
+              </a:rPr>
+              <a:t>Makes </a:t>
+            </a:r>
+            <a:r>
+              <a:rPr lang="en-NZ" dirty="0">
+                <a:solidFill>
+                  <a:schemeClr val="tx2">
+                    <a:lumMod val="40000"/>
+                    <a:lumOff val="60000"/>
+                  </a:schemeClr>
+                </a:solidFill>
+              </a:rPr>
+              <a:t>a queue of DOM changes</a:t>
+            </a:r>
+          </a:p>
+          <a:p>
+            <a:r>
+              <a:rPr lang="en-NZ" dirty="0">
+                <a:solidFill>
+                  <a:schemeClr val="tx2">
+                    <a:lumMod val="40000"/>
+                    <a:lumOff val="60000"/>
+                  </a:schemeClr>
+                </a:solidFill>
+              </a:rPr>
+              <a:t>Executes all of these changes without </a:t>
+            </a:r>
+            <a:endParaRPr lang="en-NZ" dirty="0" smtClean="0">
+              <a:solidFill>
+                <a:schemeClr val="tx2">
+                  <a:lumMod val="40000"/>
+                  <a:lumOff val="60000"/>
+                </a:schemeClr>
+              </a:solidFill>
+            </a:endParaRPr>
+          </a:p>
+          <a:p>
+            <a:r>
+              <a:rPr lang="en-NZ" dirty="0" smtClean="0">
+                <a:solidFill>
+                  <a:schemeClr val="tx2">
+                    <a:lumMod val="40000"/>
+                    <a:lumOff val="60000"/>
+                  </a:schemeClr>
+                </a:solidFill>
+              </a:rPr>
+              <a:t>re-rendering </a:t>
+            </a:r>
+            <a:r>
+              <a:rPr lang="en-NZ" dirty="0">
+                <a:solidFill>
+                  <a:schemeClr val="tx2">
+                    <a:lumMod val="40000"/>
+                    <a:lumOff val="60000"/>
+                  </a:schemeClr>
+                </a:solidFill>
+              </a:rPr>
+              <a:t>the whole page</a:t>
+            </a:r>
+          </a:p>
+          <a:p>
             <a:endParaRPr lang="en-NZ" dirty="0">
               <a:solidFill>
                 <a:schemeClr val="tx2">
@@ -7325,184 +7581,6 @@
               </a:solidFill>
             </a:endParaRPr>
           </a:p>
-          <a:p>
-            <a:pPr marL="342900" indent="-342900">
-              <a:buFont typeface="Arial" panose="020B0604020202020204" pitchFamily="34" charset="0"/>
-              <a:buChar char="•"/>
-            </a:pPr>
-            <a:r>
-              <a:rPr lang="en-NZ" dirty="0" smtClean="0">
-                <a:solidFill>
-                  <a:schemeClr val="tx2">
-                    <a:lumMod val="40000"/>
-                    <a:lumOff val="60000"/>
-                  </a:schemeClr>
-                </a:solidFill>
-              </a:rPr>
-              <a:t>React builds a new virtual DOM tree</a:t>
-            </a:r>
-          </a:p>
-          <a:p>
-            <a:pPr marL="342900" indent="-342900">
-              <a:buFont typeface="Arial" panose="020B0604020202020204" pitchFamily="34" charset="0"/>
-              <a:buChar char="•"/>
-            </a:pPr>
-            <a:r>
-              <a:rPr lang="en-NZ" dirty="0" smtClean="0">
-                <a:solidFill>
-                  <a:schemeClr val="tx2">
-                    <a:lumMod val="40000"/>
-                    <a:lumOff val="60000"/>
-                  </a:schemeClr>
-                </a:solidFill>
-              </a:rPr>
-              <a:t>Diff’s it with the old tree (similar to git)</a:t>
-            </a:r>
-          </a:p>
-          <a:p>
-            <a:pPr marL="342900" indent="-342900">
-              <a:buFont typeface="Arial" panose="020B0604020202020204" pitchFamily="34" charset="0"/>
-              <a:buChar char="•"/>
-            </a:pPr>
-            <a:r>
-              <a:rPr lang="en-NZ" dirty="0" smtClean="0">
-                <a:solidFill>
-                  <a:schemeClr val="tx2">
-                    <a:lumMod val="40000"/>
-                    <a:lumOff val="60000"/>
-                  </a:schemeClr>
-                </a:solidFill>
-              </a:rPr>
-              <a:t>Makes a queue of DOM changes</a:t>
-            </a:r>
-          </a:p>
-          <a:p>
-            <a:pPr marL="342900" indent="-342900">
-              <a:buFont typeface="Arial" panose="020B0604020202020204" pitchFamily="34" charset="0"/>
-              <a:buChar char="•"/>
-            </a:pPr>
-            <a:r>
-              <a:rPr lang="en-NZ" dirty="0" smtClean="0">
-                <a:solidFill>
-                  <a:schemeClr val="tx2">
-                    <a:lumMod val="40000"/>
-                    <a:lumOff val="60000"/>
-                  </a:schemeClr>
-                </a:solidFill>
-              </a:rPr>
-              <a:t>Executes all of these changes without re-rendering the whole page</a:t>
-            </a:r>
-            <a:endParaRPr lang="en-NZ" dirty="0" smtClean="0">
-              <a:solidFill>
-                <a:schemeClr val="tx2">
-                  <a:lumMod val="40000"/>
-                  <a:lumOff val="60000"/>
-                </a:schemeClr>
-              </a:solidFill>
-            </a:endParaRPr>
-          </a:p>
-        </p:txBody>
-      </p:sp>
-    </p:spTree>
-    <p:extLst>
-      <p:ext uri="{BB962C8B-B14F-4D97-AF65-F5344CB8AC3E}">
-        <p14:creationId xmlns:p14="http://schemas.microsoft.com/office/powerpoint/2010/main" val="2732565840"/>
-      </p:ext>
-    </p:extLst>
-  </p:cSld>
-  <p:clrMapOvr>
-    <a:masterClrMapping/>
-  </p:clrMapOvr>
-  <p:timing>
-    <p:tnLst>
-      <p:par>
-        <p:cTn id="1" dur="indefinite" restart="never" nodeType="tmRoot"/>
-      </p:par>
-    </p:tnLst>
-  </p:timing>
-</p:sld>
-</file>
-
-<file path=ppt/slides/slide8.xml><?xml version="1.0" encoding="utf-8"?>
-<p:sld xmlns:a="http://schemas.openxmlformats.org/drawingml/2006/main" xmlns:r="http://schemas.openxmlformats.org/officeDocument/2006/relationships" xmlns:p="http://schemas.openxmlformats.org/presentationml/2006/main">
-  <p:cSld>
-    <p:spTree>
-      <p:nvGrpSpPr>
-        <p:cNvPr id="1" name=""/>
-        <p:cNvGrpSpPr/>
-        <p:nvPr/>
-      </p:nvGrpSpPr>
-      <p:grpSpPr>
-        <a:xfrm>
-          <a:off x="0" y="0"/>
-          <a:ext cx="0" cy="0"/>
-          <a:chOff x="0" y="0"/>
-          <a:chExt cx="0" cy="0"/>
-        </a:xfrm>
-      </p:grpSpPr>
-      <p:sp>
-        <p:nvSpPr>
-          <p:cNvPr id="2" name="Title 1"/>
-          <p:cNvSpPr>
-            <a:spLocks noGrp="1"/>
-          </p:cNvSpPr>
-          <p:nvPr>
-            <p:ph type="ctrTitle"/>
-          </p:nvPr>
-        </p:nvSpPr>
-        <p:spPr>
-          <a:xfrm>
-            <a:off x="684211" y="-1907177"/>
-            <a:ext cx="8001000" cy="2971801"/>
-          </a:xfrm>
-        </p:spPr>
-        <p:txBody>
-          <a:bodyPr>
-            <a:normAutofit/>
-          </a:bodyPr>
-          <a:lstStyle/>
-          <a:p>
-            <a:r>
-              <a:rPr lang="en-NZ" sz="4000" dirty="0" smtClean="0">
-                <a:solidFill>
-                  <a:schemeClr val="tx2">
-                    <a:lumMod val="40000"/>
-                    <a:lumOff val="60000"/>
-                  </a:schemeClr>
-                </a:solidFill>
-              </a:rPr>
-              <a:t>Component based structure</a:t>
-            </a:r>
-            <a:endParaRPr lang="en-NZ" sz="4000" dirty="0">
-              <a:solidFill>
-                <a:schemeClr val="tx2">
-                  <a:lumMod val="40000"/>
-                  <a:lumOff val="60000"/>
-                </a:schemeClr>
-              </a:solidFill>
-            </a:endParaRPr>
-          </a:p>
-        </p:txBody>
-      </p:sp>
-      <p:sp>
-        <p:nvSpPr>
-          <p:cNvPr id="3" name="Subtitle 2"/>
-          <p:cNvSpPr>
-            <a:spLocks noGrp="1"/>
-          </p:cNvSpPr>
-          <p:nvPr>
-            <p:ph type="subTitle" idx="1"/>
-          </p:nvPr>
-        </p:nvSpPr>
-        <p:spPr>
-          <a:xfrm>
-            <a:off x="684211" y="1064624"/>
-            <a:ext cx="6957559" cy="5427616"/>
-          </a:xfrm>
-        </p:spPr>
-        <p:txBody>
-          <a:bodyPr/>
-          <a:lstStyle/>
           <a:p>
             <a:pPr marL="342900" indent="-342900">
               <a:buFont typeface="Arial" panose="020B0604020202020204" pitchFamily="34" charset="0"/>
@@ -7517,126 +7595,12 @@
               </a:solidFill>
             </a:endParaRPr>
           </a:p>
-          <a:p>
-            <a:pPr marL="342900" indent="-342900">
-              <a:buFont typeface="Arial" panose="020B0604020202020204" pitchFamily="34" charset="0"/>
-              <a:buChar char="•"/>
-            </a:pPr>
-            <a:r>
-              <a:rPr lang="en-NZ" dirty="0" smtClean="0">
-                <a:solidFill>
-                  <a:schemeClr val="tx2">
-                    <a:lumMod val="40000"/>
-                    <a:lumOff val="60000"/>
-                  </a:schemeClr>
-                </a:solidFill>
-              </a:rPr>
-              <a:t>Easily re-use components anywhere on your site</a:t>
-            </a:r>
-          </a:p>
-          <a:p>
-            <a:pPr marL="342900" indent="-342900">
-              <a:buFont typeface="Arial" panose="020B0604020202020204" pitchFamily="34" charset="0"/>
-              <a:buChar char="•"/>
-            </a:pPr>
-            <a:r>
-              <a:rPr lang="en-NZ" dirty="0" smtClean="0">
-                <a:solidFill>
-                  <a:schemeClr val="tx2">
-                    <a:lumMod val="40000"/>
-                    <a:lumOff val="60000"/>
-                  </a:schemeClr>
-                </a:solidFill>
-              </a:rPr>
-              <a:t>Create components for anything (buttons, checkboxes, dropdowns </a:t>
-            </a:r>
-            <a:r>
-              <a:rPr lang="en-NZ" dirty="0" err="1" smtClean="0">
-                <a:solidFill>
-                  <a:schemeClr val="tx2">
-                    <a:lumMod val="40000"/>
-                    <a:lumOff val="60000"/>
-                  </a:schemeClr>
-                </a:solidFill>
-              </a:rPr>
-              <a:t>etc</a:t>
-            </a:r>
-            <a:r>
-              <a:rPr lang="en-NZ" dirty="0" smtClean="0">
-                <a:solidFill>
-                  <a:schemeClr val="tx2">
-                    <a:lumMod val="40000"/>
-                    <a:lumOff val="60000"/>
-                  </a:schemeClr>
-                </a:solidFill>
-              </a:rPr>
-              <a:t>).</a:t>
-            </a:r>
-          </a:p>
-          <a:p>
-            <a:pPr marL="342900" indent="-342900">
-              <a:buFont typeface="Arial" panose="020B0604020202020204" pitchFamily="34" charset="0"/>
-              <a:buChar char="•"/>
-            </a:pPr>
-            <a:r>
-              <a:rPr lang="en-NZ" dirty="0" smtClean="0">
-                <a:solidFill>
-                  <a:schemeClr val="tx2">
-                    <a:lumMod val="40000"/>
-                    <a:lumOff val="60000"/>
-                  </a:schemeClr>
-                </a:solidFill>
-              </a:rPr>
-              <a:t>Smart components / Dumb components (can have as much / as little logic as it wants).</a:t>
-            </a:r>
-          </a:p>
-          <a:p>
-            <a:pPr marL="342900" indent="-342900">
-              <a:buFont typeface="Arial" panose="020B0604020202020204" pitchFamily="34" charset="0"/>
-              <a:buChar char="•"/>
-            </a:pPr>
-            <a:r>
-              <a:rPr lang="en-NZ" dirty="0" smtClean="0">
-                <a:solidFill>
-                  <a:schemeClr val="tx2">
-                    <a:lumMod val="40000"/>
-                    <a:lumOff val="60000"/>
-                  </a:schemeClr>
-                </a:solidFill>
-              </a:rPr>
-              <a:t>Makes it easier to develop your code base and keep things clean</a:t>
-            </a:r>
-          </a:p>
-          <a:p>
-            <a:endParaRPr lang="en-NZ" dirty="0" smtClean="0">
-              <a:solidFill>
-                <a:schemeClr val="tx2">
-                  <a:lumMod val="40000"/>
-                  <a:lumOff val="60000"/>
-                </a:schemeClr>
-              </a:solidFill>
-            </a:endParaRPr>
-          </a:p>
-          <a:p>
-            <a:pPr marL="342900" indent="-342900">
-              <a:buFont typeface="Arial" panose="020B0604020202020204" pitchFamily="34" charset="0"/>
-              <a:buChar char="•"/>
-            </a:pPr>
-            <a:endParaRPr lang="en-NZ" dirty="0" smtClean="0">
-              <a:solidFill>
-                <a:schemeClr val="tx2">
-                  <a:lumMod val="40000"/>
-                  <a:lumOff val="60000"/>
-                </a:schemeClr>
-              </a:solidFill>
-            </a:endParaRPr>
-          </a:p>
         </p:txBody>
       </p:sp>
     </p:spTree>
     <p:extLst>
       <p:ext uri="{BB962C8B-B14F-4D97-AF65-F5344CB8AC3E}">
-        <p14:creationId xmlns:p14="http://schemas.microsoft.com/office/powerpoint/2010/main" val="3430355815"/>
+        <p14:creationId xmlns:p14="http://schemas.microsoft.com/office/powerpoint/2010/main" val="666344581"/>
       </p:ext>
     </p:extLst>
   </p:cSld>

</xml_diff>